<commit_message>
Update presentation and change fog params
</commit_message>
<xml_diff>
--- a/Presentation.pptx
+++ b/Presentation.pptx
@@ -267,7 +267,7 @@
           <a:p>
             <a:fld id="{541B350F-977A-45F1-9D02-725BAD40C7D3}" type="datetimeFigureOut">
               <a:rPr lang="de-DE" smtClean="0"/>
-              <a:t>26.01.2020</a:t>
+              <a:t>29.01.2020</a:t>
             </a:fld>
             <a:endParaRPr lang="de-DE"/>
           </a:p>
@@ -555,7 +555,7 @@
           <a:p>
             <a:fld id="{541B350F-977A-45F1-9D02-725BAD40C7D3}" type="datetimeFigureOut">
               <a:rPr lang="de-DE" smtClean="0"/>
-              <a:t>26.01.2020</a:t>
+              <a:t>29.01.2020</a:t>
             </a:fld>
             <a:endParaRPr lang="de-DE"/>
           </a:p>
@@ -753,7 +753,7 @@
           <a:p>
             <a:fld id="{541B350F-977A-45F1-9D02-725BAD40C7D3}" type="datetimeFigureOut">
               <a:rPr lang="de-DE" smtClean="0"/>
-              <a:t>26.01.2020</a:t>
+              <a:t>29.01.2020</a:t>
             </a:fld>
             <a:endParaRPr lang="de-DE"/>
           </a:p>
@@ -961,7 +961,7 @@
           <a:p>
             <a:fld id="{541B350F-977A-45F1-9D02-725BAD40C7D3}" type="datetimeFigureOut">
               <a:rPr lang="de-DE" smtClean="0"/>
-              <a:t>26.01.2020</a:t>
+              <a:t>29.01.2020</a:t>
             </a:fld>
             <a:endParaRPr lang="de-DE"/>
           </a:p>
@@ -1102,7 +1102,7 @@
           <a:p>
             <a:fld id="{541B350F-977A-45F1-9D02-725BAD40C7D3}" type="datetimeFigureOut">
               <a:rPr lang="de-DE" smtClean="0"/>
-              <a:t>26.01.2020</a:t>
+              <a:t>29.01.2020</a:t>
             </a:fld>
             <a:endParaRPr lang="de-DE"/>
           </a:p>
@@ -1300,7 +1300,7 @@
           <a:p>
             <a:fld id="{541B350F-977A-45F1-9D02-725BAD40C7D3}" type="datetimeFigureOut">
               <a:rPr lang="de-DE" smtClean="0"/>
-              <a:t>26.01.2020</a:t>
+              <a:t>29.01.2020</a:t>
             </a:fld>
             <a:endParaRPr lang="de-DE"/>
           </a:p>
@@ -1575,7 +1575,7 @@
           <a:p>
             <a:fld id="{541B350F-977A-45F1-9D02-725BAD40C7D3}" type="datetimeFigureOut">
               <a:rPr lang="de-DE" smtClean="0"/>
-              <a:t>26.01.2020</a:t>
+              <a:t>29.01.2020</a:t>
             </a:fld>
             <a:endParaRPr lang="de-DE"/>
           </a:p>
@@ -1840,7 +1840,7 @@
           <a:p>
             <a:fld id="{541B350F-977A-45F1-9D02-725BAD40C7D3}" type="datetimeFigureOut">
               <a:rPr lang="de-DE" smtClean="0"/>
-              <a:t>26.01.2020</a:t>
+              <a:t>29.01.2020</a:t>
             </a:fld>
             <a:endParaRPr lang="de-DE"/>
           </a:p>
@@ -2252,7 +2252,7 @@
           <a:p>
             <a:fld id="{541B350F-977A-45F1-9D02-725BAD40C7D3}" type="datetimeFigureOut">
               <a:rPr lang="de-DE" smtClean="0"/>
-              <a:t>26.01.2020</a:t>
+              <a:t>29.01.2020</a:t>
             </a:fld>
             <a:endParaRPr lang="de-DE"/>
           </a:p>
@@ -2393,7 +2393,7 @@
           <a:p>
             <a:fld id="{541B350F-977A-45F1-9D02-725BAD40C7D3}" type="datetimeFigureOut">
               <a:rPr lang="de-DE" smtClean="0"/>
-              <a:t>26.01.2020</a:t>
+              <a:t>29.01.2020</a:t>
             </a:fld>
             <a:endParaRPr lang="de-DE"/>
           </a:p>
@@ -2506,7 +2506,7 @@
           <a:p>
             <a:fld id="{541B350F-977A-45F1-9D02-725BAD40C7D3}" type="datetimeFigureOut">
               <a:rPr lang="de-DE" smtClean="0"/>
-              <a:t>26.01.2020</a:t>
+              <a:t>29.01.2020</a:t>
             </a:fld>
             <a:endParaRPr lang="de-DE"/>
           </a:p>
@@ -2817,7 +2817,7 @@
           <a:p>
             <a:fld id="{541B350F-977A-45F1-9D02-725BAD40C7D3}" type="datetimeFigureOut">
               <a:rPr lang="de-DE" smtClean="0"/>
-              <a:t>26.01.2020</a:t>
+              <a:t>29.01.2020</a:t>
             </a:fld>
             <a:endParaRPr lang="de-DE"/>
           </a:p>
@@ -3078,7 +3078,7 @@
           <a:p>
             <a:fld id="{541B350F-977A-45F1-9D02-725BAD40C7D3}" type="datetimeFigureOut">
               <a:rPr lang="de-DE" smtClean="0"/>
-              <a:t>26.01.2020</a:t>
+              <a:t>29.01.2020</a:t>
             </a:fld>
             <a:endParaRPr lang="de-DE"/>
           </a:p>
@@ -3772,7 +3772,7 @@
           <a:lstStyle/>
           <a:p>
             <a:r>
-              <a:rPr lang="de-DE">
+              <a:rPr lang="de-DE" dirty="0" err="1">
                 <a:solidFill>
                   <a:schemeClr val="accent2"/>
                 </a:solidFill>
@@ -3924,7 +3924,7 @@
           <a:p>
             <a:r>
               <a:rPr lang="de-DE" dirty="0"/>
-              <a:t>Fog Video (30 sec)</a:t>
+              <a:t>Fog Demo (1 min)</a:t>
             </a:r>
           </a:p>
         </p:txBody>
@@ -3981,17 +3981,33 @@
           <a:lstStyle/>
           <a:p>
             <a:r>
-              <a:rPr lang="de-DE" dirty="0"/>
+              <a:rPr lang="de-DE" dirty="0">
+                <a:solidFill>
+                  <a:schemeClr val="accent2"/>
+                </a:solidFill>
+                <a:latin typeface="Bahnschrift" panose="020B0502040204020203" pitchFamily="34" charset="0"/>
+              </a:rPr>
               <a:t>Light </a:t>
             </a:r>
             <a:r>
-              <a:rPr lang="de-DE" dirty="0" err="1"/>
+              <a:rPr lang="de-DE" dirty="0" err="1">
+                <a:solidFill>
+                  <a:schemeClr val="accent2"/>
+                </a:solidFill>
+                <a:latin typeface="Bahnschrift" panose="020B0502040204020203" pitchFamily="34" charset="0"/>
+              </a:rPr>
               <a:t>Scattering</a:t>
             </a:r>
             <a:r>
-              <a:rPr lang="de-DE" dirty="0"/>
-              <a:t> Theory (2 min)</a:t>
-            </a:r>
+              <a:rPr lang="de-DE" dirty="0">
+                <a:solidFill>
+                  <a:schemeClr val="accent2"/>
+                </a:solidFill>
+                <a:latin typeface="Bahnschrift" panose="020B0502040204020203" pitchFamily="34" charset="0"/>
+              </a:rPr>
+              <a:t> Theory</a:t>
+            </a:r>
+            <a:endParaRPr lang="de-DE" dirty="0"/>
           </a:p>
         </p:txBody>
       </p:sp>
@@ -4011,69 +4027,793 @@
             <p:ph idx="1"/>
           </p:nvPr>
         </p:nvSpPr>
-        <p:spPr/>
+        <p:spPr>
+          <a:xfrm>
+            <a:off x="7694720" y="1479697"/>
+            <a:ext cx="4497280" cy="2175669"/>
+          </a:xfrm>
+        </p:spPr>
         <p:txBody>
           <a:bodyPr/>
           <a:lstStyle/>
           <a:p>
             <a:r>
-              <a:rPr lang="de-DE" dirty="0"/>
-              <a:t>Formula</a:t>
-            </a:r>
-          </a:p>
-          <a:p>
-            <a:r>
-              <a:rPr lang="de-DE" dirty="0"/>
+              <a:rPr lang="de-DE" dirty="0">
+                <a:solidFill>
+                  <a:schemeClr val="bg1"/>
+                </a:solidFill>
+                <a:latin typeface="Bahnschrift" panose="020B0502040204020203" pitchFamily="34" charset="0"/>
+              </a:rPr>
               <a:t>Beer-Lambert-Law</a:t>
             </a:r>
           </a:p>
           <a:p>
             <a:r>
-              <a:rPr lang="de-DE" dirty="0"/>
+              <a:rPr lang="de-DE" dirty="0">
+                <a:solidFill>
+                  <a:schemeClr val="bg1"/>
+                </a:solidFill>
+                <a:latin typeface="Bahnschrift" panose="020B0502040204020203" pitchFamily="34" charset="0"/>
+              </a:rPr>
               <a:t>Phase </a:t>
             </a:r>
             <a:r>
-              <a:rPr lang="de-DE" dirty="0" err="1"/>
+              <a:rPr lang="de-DE" dirty="0" err="1">
+                <a:solidFill>
+                  <a:schemeClr val="bg1"/>
+                </a:solidFill>
+                <a:latin typeface="Bahnschrift" panose="020B0502040204020203" pitchFamily="34" charset="0"/>
+              </a:rPr>
               <a:t>function</a:t>
             </a:r>
             <a:r>
-              <a:rPr lang="de-DE" dirty="0"/>
+              <a:rPr lang="de-DE" dirty="0">
+                <a:solidFill>
+                  <a:schemeClr val="bg1"/>
+                </a:solidFill>
+                <a:latin typeface="Bahnschrift" panose="020B0502040204020203" pitchFamily="34" charset="0"/>
+              </a:rPr>
               <a:t> </a:t>
             </a:r>
           </a:p>
           <a:p>
             <a:r>
-              <a:rPr lang="de-DE" dirty="0" err="1"/>
+              <a:rPr lang="de-DE" dirty="0" err="1">
+                <a:solidFill>
+                  <a:schemeClr val="bg1"/>
+                </a:solidFill>
+                <a:latin typeface="Bahnschrift" panose="020B0502040204020203" pitchFamily="34" charset="0"/>
+              </a:rPr>
               <a:t>Might</a:t>
             </a:r>
             <a:r>
-              <a:rPr lang="de-DE" dirty="0"/>
+              <a:rPr lang="de-DE" dirty="0">
+                <a:solidFill>
+                  <a:schemeClr val="bg1"/>
+                </a:solidFill>
+                <a:latin typeface="Bahnschrift" panose="020B0502040204020203" pitchFamily="34" charset="0"/>
+              </a:rPr>
               <a:t> </a:t>
             </a:r>
             <a:r>
-              <a:rPr lang="de-DE" dirty="0" err="1"/>
+              <a:rPr lang="de-DE" dirty="0" err="1">
+                <a:solidFill>
+                  <a:schemeClr val="bg1"/>
+                </a:solidFill>
+                <a:latin typeface="Bahnschrift" panose="020B0502040204020203" pitchFamily="34" charset="0"/>
+              </a:rPr>
               <a:t>be</a:t>
             </a:r>
             <a:r>
-              <a:rPr lang="de-DE" dirty="0"/>
+              <a:rPr lang="de-DE" dirty="0">
+                <a:solidFill>
+                  <a:schemeClr val="bg1"/>
+                </a:solidFill>
+                <a:latin typeface="Bahnschrift" panose="020B0502040204020203" pitchFamily="34" charset="0"/>
+              </a:rPr>
               <a:t> </a:t>
             </a:r>
             <a:r>
-              <a:rPr lang="de-DE" dirty="0" err="1"/>
+              <a:rPr lang="de-DE" dirty="0" err="1">
+                <a:solidFill>
+                  <a:schemeClr val="bg1"/>
+                </a:solidFill>
+                <a:latin typeface="Bahnschrift" panose="020B0502040204020203" pitchFamily="34" charset="0"/>
+              </a:rPr>
               <a:t>wavelength</a:t>
             </a:r>
             <a:r>
-              <a:rPr lang="de-DE" dirty="0"/>
+              <a:rPr lang="de-DE" dirty="0">
+                <a:solidFill>
+                  <a:schemeClr val="bg1"/>
+                </a:solidFill>
+                <a:latin typeface="Bahnschrift" panose="020B0502040204020203" pitchFamily="34" charset="0"/>
+              </a:rPr>
               <a:t> </a:t>
             </a:r>
             <a:r>
-              <a:rPr lang="de-DE" dirty="0" err="1"/>
+              <a:rPr lang="de-DE" dirty="0" err="1">
+                <a:solidFill>
+                  <a:schemeClr val="bg1"/>
+                </a:solidFill>
+                <a:latin typeface="Bahnschrift" panose="020B0502040204020203" pitchFamily="34" charset="0"/>
+              </a:rPr>
               <a:t>dependent</a:t>
             </a:r>
-            <a:endParaRPr lang="de-DE" dirty="0"/>
-          </a:p>
-        </p:txBody>
-      </p:sp>
+            <a:endParaRPr lang="de-DE" dirty="0">
+              <a:solidFill>
+                <a:schemeClr val="bg1"/>
+              </a:solidFill>
+              <a:latin typeface="Bahnschrift" panose="020B0502040204020203" pitchFamily="34" charset="0"/>
+            </a:endParaRPr>
+          </a:p>
+        </p:txBody>
+      </p:sp>
+      <p:pic>
+        <p:nvPicPr>
+          <p:cNvPr id="7" name="Grafik 6" descr="Ein Bild, das Uhr enthält.&#10;&#10;Automatisch generierte Beschreibung">
+            <a:extLst>
+              <a:ext uri="{FF2B5EF4-FFF2-40B4-BE49-F238E27FC236}">
+                <a16:creationId xmlns:a16="http://schemas.microsoft.com/office/drawing/2014/main" id="{989CE3CD-C0A9-4576-A8C5-27A13F1E5B90}"/>
+              </a:ext>
+            </a:extLst>
+          </p:cNvPr>
+          <p:cNvPicPr>
+            <a:picLocks noChangeAspect="1"/>
+          </p:cNvPicPr>
+          <p:nvPr/>
+        </p:nvPicPr>
+        <p:blipFill>
+          <a:blip r:embed="rId2">
+            <a:extLst>
+              <a:ext uri="{28A0092B-C50C-407E-A947-70E740481C1C}">
+                <a14:useLocalDpi xmlns:a14="http://schemas.microsoft.com/office/drawing/2010/main" val="0"/>
+              </a:ext>
+            </a:extLst>
+          </a:blip>
+          <a:stretch>
+            <a:fillRect/>
+          </a:stretch>
+        </p:blipFill>
+        <p:spPr>
+          <a:xfrm>
+            <a:off x="838200" y="1479697"/>
+            <a:ext cx="6670197" cy="2521596"/>
+          </a:xfrm>
+          <a:prstGeom prst="rect">
+            <a:avLst/>
+          </a:prstGeom>
+        </p:spPr>
+      </p:pic>
+      <mc:AlternateContent xmlns:mc="http://schemas.openxmlformats.org/markup-compatibility/2006">
+        <mc:Choice xmlns:a14="http://schemas.microsoft.com/office/drawing/2010/main" Requires="a14">
+          <p:sp>
+            <p:nvSpPr>
+              <p:cNvPr id="9" name="Textfeld 8">
+                <a:extLst>
+                  <a:ext uri="{FF2B5EF4-FFF2-40B4-BE49-F238E27FC236}">
+                    <a16:creationId xmlns:a16="http://schemas.microsoft.com/office/drawing/2014/main" id="{B9BB7C2A-42D7-4D45-AA6E-EF34021B01BD}"/>
+                  </a:ext>
+                </a:extLst>
+              </p:cNvPr>
+              <p:cNvSpPr txBox="1"/>
+              <p:nvPr/>
+            </p:nvSpPr>
+            <p:spPr>
+              <a:xfrm>
+                <a:off x="435007" y="4381492"/>
+                <a:ext cx="10918793" cy="996811"/>
+              </a:xfrm>
+              <a:prstGeom prst="rect">
+                <a:avLst/>
+              </a:prstGeom>
+              <a:noFill/>
+            </p:spPr>
+            <p:txBody>
+              <a:bodyPr wrap="square" lIns="0" tIns="0" rIns="0" bIns="0" rtlCol="0">
+                <a:spAutoFit/>
+              </a:bodyPr>
+              <a:lstStyle/>
+              <a:p>
+                <a14:m>
+                  <m:oMathPara xmlns:m="http://schemas.openxmlformats.org/officeDocument/2006/math">
+                    <m:oMathParaPr>
+                      <m:jc m:val="centerGroup"/>
+                    </m:oMathParaPr>
+                    <m:oMath xmlns:m="http://schemas.openxmlformats.org/officeDocument/2006/math">
+                      <m:sSub>
+                        <m:sSubPr>
+                          <m:ctrlPr>
+                            <a:rPr lang="pt-BR" sz="2800" b="0" i="1" smtClean="0">
+                              <a:solidFill>
+                                <a:schemeClr val="bg1"/>
+                              </a:solidFill>
+                              <a:latin typeface="Cambria Math" panose="02040503050406030204" pitchFamily="18" charset="0"/>
+                            </a:rPr>
+                          </m:ctrlPr>
+                        </m:sSubPr>
+                        <m:e>
+                          <m:r>
+                            <a:rPr lang="de-DE" sz="2800" b="0" i="1" smtClean="0">
+                              <a:solidFill>
+                                <a:schemeClr val="bg1"/>
+                              </a:solidFill>
+                              <a:latin typeface="Cambria Math" panose="02040503050406030204" pitchFamily="18" charset="0"/>
+                            </a:rPr>
+                            <m:t>𝐿</m:t>
+                          </m:r>
+                        </m:e>
+                        <m:sub>
+                          <m:r>
+                            <a:rPr lang="de-DE" sz="2800" b="0" i="1" smtClean="0">
+                              <a:solidFill>
+                                <a:schemeClr val="bg1"/>
+                              </a:solidFill>
+                              <a:latin typeface="Cambria Math" panose="02040503050406030204" pitchFamily="18" charset="0"/>
+                            </a:rPr>
+                            <m:t>𝑖</m:t>
+                          </m:r>
+                        </m:sub>
+                      </m:sSub>
+                      <m:d>
+                        <m:dPr>
+                          <m:ctrlPr>
+                            <a:rPr lang="de-DE" sz="2800" b="0" i="1" smtClean="0">
+                              <a:solidFill>
+                                <a:schemeClr val="bg1"/>
+                              </a:solidFill>
+                              <a:latin typeface="Cambria Math" panose="02040503050406030204" pitchFamily="18" charset="0"/>
+                            </a:rPr>
+                          </m:ctrlPr>
+                        </m:dPr>
+                        <m:e>
+                          <m:r>
+                            <a:rPr lang="de-DE" sz="2800" b="0" i="1" smtClean="0">
+                              <a:solidFill>
+                                <a:schemeClr val="bg1"/>
+                              </a:solidFill>
+                              <a:latin typeface="Cambria Math" panose="02040503050406030204" pitchFamily="18" charset="0"/>
+                            </a:rPr>
+                            <m:t>𝑐</m:t>
+                          </m:r>
+                          <m:r>
+                            <a:rPr lang="de-DE" sz="2800" b="0" i="1" smtClean="0">
+                              <a:solidFill>
+                                <a:schemeClr val="bg1"/>
+                              </a:solidFill>
+                              <a:latin typeface="Cambria Math" panose="02040503050406030204" pitchFamily="18" charset="0"/>
+                            </a:rPr>
+                            <m:t>, −</m:t>
+                          </m:r>
+                          <m:r>
+                            <a:rPr lang="de-DE" sz="2800" b="0" i="1" smtClean="0">
+                              <a:solidFill>
+                                <a:schemeClr val="bg1"/>
+                              </a:solidFill>
+                              <a:latin typeface="Cambria Math" panose="02040503050406030204" pitchFamily="18" charset="0"/>
+                            </a:rPr>
+                            <m:t>𝑣</m:t>
+                          </m:r>
+                        </m:e>
+                      </m:d>
+                      <m:r>
+                        <a:rPr lang="de-DE" sz="2800" b="0" i="1" smtClean="0">
+                          <a:solidFill>
+                            <a:schemeClr val="bg1"/>
+                          </a:solidFill>
+                          <a:latin typeface="Cambria Math" panose="02040503050406030204" pitchFamily="18" charset="0"/>
+                        </a:rPr>
+                        <m:t>=</m:t>
+                      </m:r>
+                      <m:sSub>
+                        <m:sSubPr>
+                          <m:ctrlPr>
+                            <a:rPr lang="de-DE" sz="2800" b="0" i="1" smtClean="0">
+                              <a:solidFill>
+                                <a:schemeClr val="bg1"/>
+                              </a:solidFill>
+                              <a:latin typeface="Cambria Math" panose="02040503050406030204" pitchFamily="18" charset="0"/>
+                            </a:rPr>
+                          </m:ctrlPr>
+                        </m:sSubPr>
+                        <m:e>
+                          <m:r>
+                            <a:rPr lang="de-DE" sz="2800" b="0" i="1" smtClean="0">
+                              <a:solidFill>
+                                <a:schemeClr val="bg1"/>
+                              </a:solidFill>
+                              <a:latin typeface="Cambria Math" panose="02040503050406030204" pitchFamily="18" charset="0"/>
+                            </a:rPr>
+                            <m:t>𝑇</m:t>
+                          </m:r>
+                        </m:e>
+                        <m:sub>
+                          <m:r>
+                            <a:rPr lang="de-DE" sz="2800" b="0" i="1" smtClean="0">
+                              <a:solidFill>
+                                <a:schemeClr val="bg1"/>
+                              </a:solidFill>
+                              <a:latin typeface="Cambria Math" panose="02040503050406030204" pitchFamily="18" charset="0"/>
+                            </a:rPr>
+                            <m:t>𝑟</m:t>
+                          </m:r>
+                        </m:sub>
+                      </m:sSub>
+                      <m:d>
+                        <m:dPr>
+                          <m:ctrlPr>
+                            <a:rPr lang="de-DE" sz="2800" b="0" i="1" smtClean="0">
+                              <a:solidFill>
+                                <a:schemeClr val="bg1"/>
+                              </a:solidFill>
+                              <a:latin typeface="Cambria Math" panose="02040503050406030204" pitchFamily="18" charset="0"/>
+                            </a:rPr>
+                          </m:ctrlPr>
+                        </m:dPr>
+                        <m:e>
+                          <m:r>
+                            <a:rPr lang="de-DE" sz="2800" b="0" i="1" smtClean="0">
+                              <a:solidFill>
+                                <a:schemeClr val="bg1"/>
+                              </a:solidFill>
+                              <a:latin typeface="Cambria Math" panose="02040503050406030204" pitchFamily="18" charset="0"/>
+                            </a:rPr>
+                            <m:t>𝑐</m:t>
+                          </m:r>
+                          <m:r>
+                            <a:rPr lang="de-DE" sz="2800" b="0" i="1" smtClean="0">
+                              <a:solidFill>
+                                <a:schemeClr val="bg1"/>
+                              </a:solidFill>
+                              <a:latin typeface="Cambria Math" panose="02040503050406030204" pitchFamily="18" charset="0"/>
+                            </a:rPr>
+                            <m:t>, </m:t>
+                          </m:r>
+                          <m:r>
+                            <a:rPr lang="de-DE" sz="2800" b="0" i="1" smtClean="0">
+                              <a:solidFill>
+                                <a:schemeClr val="bg1"/>
+                              </a:solidFill>
+                              <a:latin typeface="Cambria Math" panose="02040503050406030204" pitchFamily="18" charset="0"/>
+                            </a:rPr>
+                            <m:t>𝑝</m:t>
+                          </m:r>
+                        </m:e>
+                      </m:d>
+                      <m:sSub>
+                        <m:sSubPr>
+                          <m:ctrlPr>
+                            <a:rPr lang="de-DE" sz="2800" b="0" i="1" smtClean="0">
+                              <a:solidFill>
+                                <a:schemeClr val="bg1"/>
+                              </a:solidFill>
+                              <a:latin typeface="Cambria Math" panose="02040503050406030204" pitchFamily="18" charset="0"/>
+                            </a:rPr>
+                          </m:ctrlPr>
+                        </m:sSubPr>
+                        <m:e>
+                          <m:r>
+                            <a:rPr lang="de-DE" sz="2800" b="0" i="1" smtClean="0">
+                              <a:solidFill>
+                                <a:schemeClr val="bg1"/>
+                              </a:solidFill>
+                              <a:latin typeface="Cambria Math" panose="02040503050406030204" pitchFamily="18" charset="0"/>
+                            </a:rPr>
+                            <m:t>𝐿</m:t>
+                          </m:r>
+                        </m:e>
+                        <m:sub>
+                          <m:r>
+                            <a:rPr lang="de-DE" sz="2800" b="0" i="1" smtClean="0">
+                              <a:solidFill>
+                                <a:schemeClr val="bg1"/>
+                              </a:solidFill>
+                              <a:latin typeface="Cambria Math" panose="02040503050406030204" pitchFamily="18" charset="0"/>
+                            </a:rPr>
+                            <m:t>𝑜</m:t>
+                          </m:r>
+                        </m:sub>
+                      </m:sSub>
+                      <m:d>
+                        <m:dPr>
+                          <m:ctrlPr>
+                            <a:rPr lang="de-DE" sz="2800" b="0" i="1" smtClean="0">
+                              <a:solidFill>
+                                <a:schemeClr val="bg1"/>
+                              </a:solidFill>
+                              <a:latin typeface="Cambria Math" panose="02040503050406030204" pitchFamily="18" charset="0"/>
+                            </a:rPr>
+                          </m:ctrlPr>
+                        </m:dPr>
+                        <m:e>
+                          <m:r>
+                            <a:rPr lang="de-DE" sz="2800" b="0" i="1" smtClean="0">
+                              <a:solidFill>
+                                <a:schemeClr val="bg1"/>
+                              </a:solidFill>
+                              <a:latin typeface="Cambria Math" panose="02040503050406030204" pitchFamily="18" charset="0"/>
+                            </a:rPr>
+                            <m:t>𝑝</m:t>
+                          </m:r>
+                          <m:r>
+                            <a:rPr lang="de-DE" sz="2800" b="0" i="1" smtClean="0">
+                              <a:solidFill>
+                                <a:schemeClr val="bg1"/>
+                              </a:solidFill>
+                              <a:latin typeface="Cambria Math" panose="02040503050406030204" pitchFamily="18" charset="0"/>
+                            </a:rPr>
+                            <m:t>,</m:t>
+                          </m:r>
+                          <m:r>
+                            <a:rPr lang="de-DE" sz="2800" b="0" i="1" smtClean="0">
+                              <a:solidFill>
+                                <a:schemeClr val="bg1"/>
+                              </a:solidFill>
+                              <a:latin typeface="Cambria Math" panose="02040503050406030204" pitchFamily="18" charset="0"/>
+                            </a:rPr>
+                            <m:t>𝑣</m:t>
+                          </m:r>
+                        </m:e>
+                      </m:d>
+                      <m:r>
+                        <a:rPr lang="de-DE" sz="2800" b="0" i="1" smtClean="0">
+                          <a:solidFill>
+                            <a:schemeClr val="bg1"/>
+                          </a:solidFill>
+                          <a:latin typeface="Cambria Math" panose="02040503050406030204" pitchFamily="18" charset="0"/>
+                        </a:rPr>
+                        <m:t>+</m:t>
+                      </m:r>
+                      <m:nary>
+                        <m:naryPr>
+                          <m:ctrlPr>
+                            <a:rPr lang="de-DE" sz="2800" b="0" i="1" smtClean="0">
+                              <a:solidFill>
+                                <a:schemeClr val="bg1"/>
+                              </a:solidFill>
+                              <a:latin typeface="Cambria Math" panose="02040503050406030204" pitchFamily="18" charset="0"/>
+                            </a:rPr>
+                          </m:ctrlPr>
+                        </m:naryPr>
+                        <m:sub>
+                          <m:r>
+                            <m:rPr>
+                              <m:brk m:alnAt="23"/>
+                            </m:rPr>
+                            <a:rPr lang="de-DE" sz="2800" b="0" i="1" smtClean="0">
+                              <a:solidFill>
+                                <a:schemeClr val="bg1"/>
+                              </a:solidFill>
+                              <a:latin typeface="Cambria Math" panose="02040503050406030204" pitchFamily="18" charset="0"/>
+                            </a:rPr>
+                            <m:t>𝑡</m:t>
+                          </m:r>
+                          <m:r>
+                            <a:rPr lang="de-DE" sz="2800" b="0" i="1" smtClean="0">
+                              <a:solidFill>
+                                <a:schemeClr val="bg1"/>
+                              </a:solidFill>
+                              <a:latin typeface="Cambria Math" panose="02040503050406030204" pitchFamily="18" charset="0"/>
+                            </a:rPr>
+                            <m:t>=0</m:t>
+                          </m:r>
+                        </m:sub>
+                        <m:sup>
+                          <m:d>
+                            <m:dPr>
+                              <m:begChr m:val="‖"/>
+                              <m:endChr m:val="‖"/>
+                              <m:ctrlPr>
+                                <a:rPr lang="de-DE" sz="2800" b="0" i="1" smtClean="0">
+                                  <a:solidFill>
+                                    <a:schemeClr val="bg1"/>
+                                  </a:solidFill>
+                                  <a:latin typeface="Cambria Math" panose="02040503050406030204" pitchFamily="18" charset="0"/>
+                                </a:rPr>
+                              </m:ctrlPr>
+                            </m:dPr>
+                            <m:e>
+                              <m:r>
+                                <a:rPr lang="de-DE" sz="2800" b="0" i="1" smtClean="0">
+                                  <a:solidFill>
+                                    <a:schemeClr val="bg1"/>
+                                  </a:solidFill>
+                                  <a:latin typeface="Cambria Math" panose="02040503050406030204" pitchFamily="18" charset="0"/>
+                                </a:rPr>
+                                <m:t>𝑝</m:t>
+                              </m:r>
+                              <m:r>
+                                <a:rPr lang="de-DE" sz="2800" b="0" i="1" smtClean="0">
+                                  <a:solidFill>
+                                    <a:schemeClr val="bg1"/>
+                                  </a:solidFill>
+                                  <a:latin typeface="Cambria Math" panose="02040503050406030204" pitchFamily="18" charset="0"/>
+                                </a:rPr>
+                                <m:t>−</m:t>
+                              </m:r>
+                              <m:r>
+                                <a:rPr lang="de-DE" sz="2800" b="0" i="1" smtClean="0">
+                                  <a:solidFill>
+                                    <a:schemeClr val="bg1"/>
+                                  </a:solidFill>
+                                  <a:latin typeface="Cambria Math" panose="02040503050406030204" pitchFamily="18" charset="0"/>
+                                </a:rPr>
+                                <m:t>𝑐</m:t>
+                              </m:r>
+                            </m:e>
+                          </m:d>
+                        </m:sup>
+                        <m:e>
+                          <m:sSub>
+                            <m:sSubPr>
+                              <m:ctrlPr>
+                                <a:rPr lang="de-DE" sz="2800" b="0" i="1" smtClean="0">
+                                  <a:solidFill>
+                                    <a:schemeClr val="bg1"/>
+                                  </a:solidFill>
+                                  <a:latin typeface="Cambria Math" panose="02040503050406030204" pitchFamily="18" charset="0"/>
+                                </a:rPr>
+                              </m:ctrlPr>
+                            </m:sSubPr>
+                            <m:e>
+                              <m:r>
+                                <a:rPr lang="de-DE" sz="2800" b="0" i="1" smtClean="0">
+                                  <a:solidFill>
+                                    <a:schemeClr val="bg1"/>
+                                  </a:solidFill>
+                                  <a:latin typeface="Cambria Math" panose="02040503050406030204" pitchFamily="18" charset="0"/>
+                                </a:rPr>
+                                <m:t>𝑇</m:t>
+                              </m:r>
+                            </m:e>
+                            <m:sub>
+                              <m:r>
+                                <a:rPr lang="de-DE" sz="2800" b="0" i="1" smtClean="0">
+                                  <a:solidFill>
+                                    <a:schemeClr val="bg1"/>
+                                  </a:solidFill>
+                                  <a:latin typeface="Cambria Math" panose="02040503050406030204" pitchFamily="18" charset="0"/>
+                                </a:rPr>
+                                <m:t>𝑟</m:t>
+                              </m:r>
+                            </m:sub>
+                          </m:sSub>
+                          <m:d>
+                            <m:dPr>
+                              <m:ctrlPr>
+                                <a:rPr lang="de-DE" sz="2800" b="0" i="1" smtClean="0">
+                                  <a:solidFill>
+                                    <a:schemeClr val="bg1"/>
+                                  </a:solidFill>
+                                  <a:latin typeface="Cambria Math" panose="02040503050406030204" pitchFamily="18" charset="0"/>
+                                </a:rPr>
+                              </m:ctrlPr>
+                            </m:dPr>
+                            <m:e>
+                              <m:r>
+                                <a:rPr lang="de-DE" sz="2800" b="0" i="1" smtClean="0">
+                                  <a:solidFill>
+                                    <a:schemeClr val="bg1"/>
+                                  </a:solidFill>
+                                  <a:latin typeface="Cambria Math" panose="02040503050406030204" pitchFamily="18" charset="0"/>
+                                </a:rPr>
+                                <m:t>𝑐</m:t>
+                              </m:r>
+                              <m:r>
+                                <a:rPr lang="de-DE" sz="2800" b="0" i="1" smtClean="0">
+                                  <a:solidFill>
+                                    <a:schemeClr val="bg1"/>
+                                  </a:solidFill>
+                                  <a:latin typeface="Cambria Math" panose="02040503050406030204" pitchFamily="18" charset="0"/>
+                                </a:rPr>
+                                <m:t>, </m:t>
+                              </m:r>
+                              <m:r>
+                                <a:rPr lang="de-DE" sz="2800" b="0" i="1" smtClean="0">
+                                  <a:solidFill>
+                                    <a:schemeClr val="bg1"/>
+                                  </a:solidFill>
+                                  <a:latin typeface="Cambria Math" panose="02040503050406030204" pitchFamily="18" charset="0"/>
+                                </a:rPr>
+                                <m:t>𝑐</m:t>
+                              </m:r>
+                              <m:r>
+                                <a:rPr lang="de-DE" sz="2800" b="0" i="1" smtClean="0">
+                                  <a:solidFill>
+                                    <a:schemeClr val="bg1"/>
+                                  </a:solidFill>
+                                  <a:latin typeface="Cambria Math" panose="02040503050406030204" pitchFamily="18" charset="0"/>
+                                </a:rPr>
+                                <m:t>−</m:t>
+                              </m:r>
+                              <m:r>
+                                <a:rPr lang="de-DE" sz="2800" b="0" i="1" smtClean="0">
+                                  <a:solidFill>
+                                    <a:schemeClr val="bg1"/>
+                                  </a:solidFill>
+                                  <a:latin typeface="Cambria Math" panose="02040503050406030204" pitchFamily="18" charset="0"/>
+                                </a:rPr>
+                                <m:t>𝑣𝑡</m:t>
+                              </m:r>
+                            </m:e>
+                          </m:d>
+                          <m:sSub>
+                            <m:sSubPr>
+                              <m:ctrlPr>
+                                <a:rPr lang="de-DE" sz="2800" b="0" i="1" smtClean="0">
+                                  <a:solidFill>
+                                    <a:schemeClr val="bg1"/>
+                                  </a:solidFill>
+                                  <a:latin typeface="Cambria Math" panose="02040503050406030204" pitchFamily="18" charset="0"/>
+                                </a:rPr>
+                              </m:ctrlPr>
+                            </m:sSubPr>
+                            <m:e>
+                              <m:r>
+                                <a:rPr lang="de-DE" sz="2800" b="0" i="1" smtClean="0">
+                                  <a:solidFill>
+                                    <a:schemeClr val="bg1"/>
+                                  </a:solidFill>
+                                  <a:latin typeface="Cambria Math" panose="02040503050406030204" pitchFamily="18" charset="0"/>
+                                </a:rPr>
+                                <m:t>𝐿</m:t>
+                              </m:r>
+                            </m:e>
+                            <m:sub>
+                              <m:r>
+                                <a:rPr lang="de-DE" sz="2800" b="0" i="1" smtClean="0">
+                                  <a:solidFill>
+                                    <a:schemeClr val="bg1"/>
+                                  </a:solidFill>
+                                  <a:latin typeface="Cambria Math" panose="02040503050406030204" pitchFamily="18" charset="0"/>
+                                </a:rPr>
+                                <m:t>𝑠𝑐𝑎𝑡</m:t>
+                              </m:r>
+                            </m:sub>
+                          </m:sSub>
+                          <m:d>
+                            <m:dPr>
+                              <m:ctrlPr>
+                                <a:rPr lang="de-DE" sz="2800" b="0" i="1" smtClean="0">
+                                  <a:solidFill>
+                                    <a:schemeClr val="bg1"/>
+                                  </a:solidFill>
+                                  <a:latin typeface="Cambria Math" panose="02040503050406030204" pitchFamily="18" charset="0"/>
+                                </a:rPr>
+                              </m:ctrlPr>
+                            </m:dPr>
+                            <m:e>
+                              <m:r>
+                                <a:rPr lang="de-DE" sz="2800" b="0" i="1" smtClean="0">
+                                  <a:solidFill>
+                                    <a:schemeClr val="bg1"/>
+                                  </a:solidFill>
+                                  <a:latin typeface="Cambria Math" panose="02040503050406030204" pitchFamily="18" charset="0"/>
+                                </a:rPr>
+                                <m:t>𝑐</m:t>
+                              </m:r>
+                              <m:r>
+                                <a:rPr lang="de-DE" sz="2800" b="0" i="1" smtClean="0">
+                                  <a:solidFill>
+                                    <a:schemeClr val="bg1"/>
+                                  </a:solidFill>
+                                  <a:latin typeface="Cambria Math" panose="02040503050406030204" pitchFamily="18" charset="0"/>
+                                </a:rPr>
+                                <m:t>−</m:t>
+                              </m:r>
+                              <m:r>
+                                <a:rPr lang="de-DE" sz="2800" b="0" i="1" smtClean="0">
+                                  <a:solidFill>
+                                    <a:schemeClr val="bg1"/>
+                                  </a:solidFill>
+                                  <a:latin typeface="Cambria Math" panose="02040503050406030204" pitchFamily="18" charset="0"/>
+                                </a:rPr>
+                                <m:t>𝑣𝑡</m:t>
+                              </m:r>
+                              <m:r>
+                                <a:rPr lang="de-DE" sz="2800" b="0" i="1" smtClean="0">
+                                  <a:solidFill>
+                                    <a:schemeClr val="bg1"/>
+                                  </a:solidFill>
+                                  <a:latin typeface="Cambria Math" panose="02040503050406030204" pitchFamily="18" charset="0"/>
+                                </a:rPr>
+                                <m:t>, </m:t>
+                              </m:r>
+                              <m:r>
+                                <a:rPr lang="de-DE" sz="2800" b="0" i="1" smtClean="0">
+                                  <a:solidFill>
+                                    <a:schemeClr val="bg1"/>
+                                  </a:solidFill>
+                                  <a:latin typeface="Cambria Math" panose="02040503050406030204" pitchFamily="18" charset="0"/>
+                                </a:rPr>
+                                <m:t>𝑣</m:t>
+                              </m:r>
+                            </m:e>
+                          </m:d>
+                          <m:r>
+                            <a:rPr lang="de-DE" sz="2800" b="0" i="1" smtClean="0">
+                              <a:solidFill>
+                                <a:schemeClr val="bg1"/>
+                              </a:solidFill>
+                              <a:latin typeface="Cambria Math" panose="02040503050406030204" pitchFamily="18" charset="0"/>
+                            </a:rPr>
+                            <m:t>𝜎</m:t>
+                          </m:r>
+                          <m:r>
+                            <a:rPr lang="de-DE" sz="2800" b="0" i="1" smtClean="0">
+                              <a:solidFill>
+                                <a:schemeClr val="bg1"/>
+                              </a:solidFill>
+                              <a:latin typeface="Cambria Math" panose="02040503050406030204" pitchFamily="18" charset="0"/>
+                            </a:rPr>
+                            <m:t> </m:t>
+                          </m:r>
+                          <m:r>
+                            <a:rPr lang="de-DE" sz="2800" b="0" i="1" smtClean="0">
+                              <a:solidFill>
+                                <a:schemeClr val="bg1"/>
+                              </a:solidFill>
+                              <a:latin typeface="Cambria Math" panose="02040503050406030204" pitchFamily="18" charset="0"/>
+                            </a:rPr>
+                            <m:t>𝑑𝑡</m:t>
+                          </m:r>
+                        </m:e>
+                      </m:nary>
+                    </m:oMath>
+                  </m:oMathPara>
+                </a14:m>
+                <a:endParaRPr lang="de-DE" sz="2800" dirty="0">
+                  <a:latin typeface="Bodoni MT Poster Compressed" panose="02070706080601050204" pitchFamily="18" charset="0"/>
+                </a:endParaRPr>
+              </a:p>
+            </p:txBody>
+          </p:sp>
+        </mc:Choice>
+        <mc:Fallback>
+          <p:sp>
+            <p:nvSpPr>
+              <p:cNvPr id="9" name="Textfeld 8">
+                <a:extLst>
+                  <a:ext uri="{FF2B5EF4-FFF2-40B4-BE49-F238E27FC236}">
+                    <a16:creationId xmlns:a16="http://schemas.microsoft.com/office/drawing/2014/main" id="{B9BB7C2A-42D7-4D45-AA6E-EF34021B01BD}"/>
+                  </a:ext>
+                </a:extLst>
+              </p:cNvPr>
+              <p:cNvSpPr txBox="1">
+                <a:spLocks noRot="1" noChangeAspect="1" noMove="1" noResize="1" noEditPoints="1" noAdjustHandles="1" noChangeArrowheads="1" noChangeShapeType="1" noTextEdit="1"/>
+              </p:cNvSpPr>
+              <p:nvPr/>
+            </p:nvSpPr>
+            <p:spPr>
+              <a:xfrm>
+                <a:off x="435007" y="4381492"/>
+                <a:ext cx="10918793" cy="996811"/>
+              </a:xfrm>
+              <a:prstGeom prst="rect">
+                <a:avLst/>
+              </a:prstGeom>
+              <a:blipFill>
+                <a:blip r:embed="rId3"/>
+                <a:stretch>
+                  <a:fillRect/>
+                </a:stretch>
+              </a:blipFill>
+            </p:spPr>
+            <p:txBody>
+              <a:bodyPr/>
+              <a:lstStyle/>
+              <a:p>
+                <a:r>
+                  <a:rPr lang="de-DE">
+                    <a:noFill/>
+                  </a:rPr>
+                  <a:t> </a:t>
+                </a:r>
+              </a:p>
+            </p:txBody>
+          </p:sp>
+        </mc:Fallback>
+      </mc:AlternateContent>
     </p:spTree>
     <p:extLst>
       <p:ext uri="{BB962C8B-B14F-4D97-AF65-F5344CB8AC3E}">
@@ -4126,8 +4866,17 @@
           <a:lstStyle/>
           <a:p>
             <a:r>
+              <a:rPr lang="de-DE" dirty="0">
+                <a:solidFill>
+                  <a:schemeClr val="accent2"/>
+                </a:solidFill>
+                <a:latin typeface="Bahnschrift" panose="020B0502040204020203" pitchFamily="34" charset="0"/>
+              </a:rPr>
+              <a:t>Implementation</a:t>
+            </a:r>
+            <a:r>
               <a:rPr lang="de-DE" dirty="0"/>
-              <a:t>Implementation (1 min)</a:t>
+              <a:t> (1 min)</a:t>
             </a:r>
           </a:p>
         </p:txBody>
@@ -4154,191 +4903,333 @@
           <a:lstStyle/>
           <a:p>
             <a:r>
-              <a:rPr lang="de-DE" dirty="0" err="1"/>
+              <a:rPr lang="de-DE" dirty="0" err="1">
+                <a:solidFill>
+                  <a:schemeClr val="bg1"/>
+                </a:solidFill>
+                <a:latin typeface="Bahnschrift" panose="020B0502040204020203" pitchFamily="34" charset="0"/>
+              </a:rPr>
               <a:t>Frustum</a:t>
             </a:r>
             <a:r>
-              <a:rPr lang="de-DE" dirty="0"/>
+              <a:rPr lang="de-DE" dirty="0">
+                <a:solidFill>
+                  <a:schemeClr val="bg1"/>
+                </a:solidFill>
+                <a:latin typeface="Bahnschrift" panose="020B0502040204020203" pitchFamily="34" charset="0"/>
+              </a:rPr>
               <a:t> </a:t>
             </a:r>
             <a:r>
-              <a:rPr lang="de-DE" dirty="0" err="1"/>
+              <a:rPr lang="de-DE" dirty="0" err="1">
+                <a:solidFill>
+                  <a:schemeClr val="bg1"/>
+                </a:solidFill>
+                <a:latin typeface="Bahnschrift" panose="020B0502040204020203" pitchFamily="34" charset="0"/>
+              </a:rPr>
               <a:t>oriented</a:t>
             </a:r>
             <a:r>
-              <a:rPr lang="de-DE" dirty="0"/>
+              <a:rPr lang="de-DE" dirty="0">
+                <a:solidFill>
+                  <a:schemeClr val="bg1"/>
+                </a:solidFill>
+                <a:latin typeface="Bahnschrift" panose="020B0502040204020203" pitchFamily="34" charset="0"/>
+              </a:rPr>
               <a:t> </a:t>
             </a:r>
             <a:r>
-              <a:rPr lang="de-DE" dirty="0" err="1"/>
+              <a:rPr lang="de-DE" dirty="0" err="1">
+                <a:solidFill>
+                  <a:schemeClr val="bg1"/>
+                </a:solidFill>
+                <a:latin typeface="Bahnschrift" panose="020B0502040204020203" pitchFamily="34" charset="0"/>
+              </a:rPr>
               <a:t>voxel</a:t>
             </a:r>
             <a:r>
-              <a:rPr lang="de-DE" dirty="0"/>
+              <a:rPr lang="de-DE" dirty="0">
+                <a:solidFill>
+                  <a:schemeClr val="bg1"/>
+                </a:solidFill>
+                <a:latin typeface="Bahnschrift" panose="020B0502040204020203" pitchFamily="34" charset="0"/>
+              </a:rPr>
               <a:t> </a:t>
             </a:r>
             <a:r>
-              <a:rPr lang="de-DE" dirty="0" err="1"/>
+              <a:rPr lang="de-DE" dirty="0" err="1">
+                <a:solidFill>
+                  <a:schemeClr val="bg1"/>
+                </a:solidFill>
+                <a:latin typeface="Bahnschrift" panose="020B0502040204020203" pitchFamily="34" charset="0"/>
+              </a:rPr>
               <a:t>grid</a:t>
             </a:r>
             <a:r>
-              <a:rPr lang="de-DE" dirty="0"/>
+              <a:rPr lang="de-DE" dirty="0">
+                <a:solidFill>
+                  <a:schemeClr val="bg1"/>
+                </a:solidFill>
+                <a:latin typeface="Bahnschrift" panose="020B0502040204020203" pitchFamily="34" charset="0"/>
+              </a:rPr>
               <a:t> (3d </a:t>
             </a:r>
             <a:r>
-              <a:rPr lang="de-DE" dirty="0" err="1"/>
+              <a:rPr lang="de-DE" dirty="0" err="1">
+                <a:solidFill>
+                  <a:schemeClr val="bg1"/>
+                </a:solidFill>
+                <a:latin typeface="Bahnschrift" panose="020B0502040204020203" pitchFamily="34" charset="0"/>
+              </a:rPr>
               <a:t>texture</a:t>
             </a:r>
             <a:r>
-              <a:rPr lang="de-DE" dirty="0"/>
+              <a:rPr lang="de-DE" dirty="0">
+                <a:solidFill>
+                  <a:schemeClr val="bg1"/>
+                </a:solidFill>
+                <a:latin typeface="Bahnschrift" panose="020B0502040204020203" pitchFamily="34" charset="0"/>
+              </a:rPr>
               <a:t>)</a:t>
             </a:r>
           </a:p>
           <a:p>
             <a:pPr lvl="1"/>
             <a:r>
-              <a:rPr lang="de-DE" dirty="0"/>
+              <a:rPr lang="de-DE" dirty="0">
+                <a:solidFill>
+                  <a:schemeClr val="bg1"/>
+                </a:solidFill>
+                <a:latin typeface="Bahnschrift" panose="020B0502040204020203" pitchFamily="34" charset="0"/>
+              </a:rPr>
               <a:t>In-</a:t>
             </a:r>
             <a:r>
-              <a:rPr lang="de-DE" dirty="0" err="1"/>
+              <a:rPr lang="de-DE" dirty="0" err="1">
+                <a:solidFill>
+                  <a:schemeClr val="bg1"/>
+                </a:solidFill>
+                <a:latin typeface="Bahnschrift" panose="020B0502040204020203" pitchFamily="34" charset="0"/>
+              </a:rPr>
               <a:t>scattering</a:t>
             </a:r>
             <a:r>
-              <a:rPr lang="de-DE" dirty="0"/>
+              <a:rPr lang="de-DE" dirty="0">
+                <a:solidFill>
+                  <a:schemeClr val="bg1"/>
+                </a:solidFill>
+                <a:latin typeface="Bahnschrift" panose="020B0502040204020203" pitchFamily="34" charset="0"/>
+              </a:rPr>
               <a:t> in RGB</a:t>
             </a:r>
           </a:p>
           <a:p>
             <a:pPr lvl="1"/>
             <a:r>
-              <a:rPr lang="de-DE" dirty="0" err="1"/>
+              <a:rPr lang="de-DE" dirty="0" err="1">
+                <a:solidFill>
+                  <a:schemeClr val="bg1"/>
+                </a:solidFill>
+                <a:latin typeface="Bahnschrift" panose="020B0502040204020203" pitchFamily="34" charset="0"/>
+              </a:rPr>
               <a:t>Scattering</a:t>
             </a:r>
             <a:r>
-              <a:rPr lang="de-DE" dirty="0"/>
+              <a:rPr lang="de-DE" dirty="0">
+                <a:solidFill>
+                  <a:schemeClr val="bg1"/>
+                </a:solidFill>
+                <a:latin typeface="Bahnschrift" panose="020B0502040204020203" pitchFamily="34" charset="0"/>
+              </a:rPr>
               <a:t> </a:t>
             </a:r>
             <a:r>
-              <a:rPr lang="de-DE" dirty="0" err="1"/>
+              <a:rPr lang="de-DE" dirty="0" err="1">
+                <a:solidFill>
+                  <a:schemeClr val="bg1"/>
+                </a:solidFill>
+                <a:latin typeface="Bahnschrift" panose="020B0502040204020203" pitchFamily="34" charset="0"/>
+              </a:rPr>
               <a:t>coefficient</a:t>
             </a:r>
             <a:r>
-              <a:rPr lang="de-DE" dirty="0"/>
+              <a:rPr lang="de-DE" dirty="0">
+                <a:solidFill>
+                  <a:schemeClr val="bg1"/>
+                </a:solidFill>
+                <a:latin typeface="Bahnschrift" panose="020B0502040204020203" pitchFamily="34" charset="0"/>
+              </a:rPr>
               <a:t> in Alpha</a:t>
             </a:r>
           </a:p>
           <a:p>
             <a:r>
-              <a:rPr lang="de-DE" dirty="0" err="1"/>
+              <a:rPr lang="de-DE" dirty="0" err="1">
+                <a:solidFill>
+                  <a:schemeClr val="bg1"/>
+                </a:solidFill>
+                <a:latin typeface="Bahnschrift" panose="020B0502040204020203" pitchFamily="34" charset="0"/>
+              </a:rPr>
               <a:t>Exponential</a:t>
             </a:r>
             <a:r>
-              <a:rPr lang="de-DE" dirty="0"/>
+              <a:rPr lang="de-DE" dirty="0">
+                <a:solidFill>
+                  <a:schemeClr val="bg1"/>
+                </a:solidFill>
+                <a:latin typeface="Bahnschrift" panose="020B0502040204020203" pitchFamily="34" charset="0"/>
+              </a:rPr>
               <a:t> </a:t>
             </a:r>
             <a:r>
-              <a:rPr lang="de-DE" dirty="0" err="1"/>
+              <a:rPr lang="de-DE" dirty="0" err="1">
+                <a:solidFill>
+                  <a:schemeClr val="bg1"/>
+                </a:solidFill>
+                <a:latin typeface="Bahnschrift" panose="020B0502040204020203" pitchFamily="34" charset="0"/>
+              </a:rPr>
               <a:t>depth</a:t>
             </a:r>
             <a:r>
-              <a:rPr lang="de-DE" dirty="0"/>
+              <a:rPr lang="de-DE" dirty="0">
+                <a:solidFill>
+                  <a:schemeClr val="bg1"/>
+                </a:solidFill>
+                <a:latin typeface="Bahnschrift" panose="020B0502040204020203" pitchFamily="34" charset="0"/>
+              </a:rPr>
               <a:t> </a:t>
             </a:r>
             <a:r>
-              <a:rPr lang="de-DE" dirty="0" err="1"/>
+              <a:rPr lang="de-DE" dirty="0" err="1">
+                <a:solidFill>
+                  <a:schemeClr val="bg1"/>
+                </a:solidFill>
+                <a:latin typeface="Bahnschrift" panose="020B0502040204020203" pitchFamily="34" charset="0"/>
+              </a:rPr>
               <a:t>distribution</a:t>
             </a:r>
-            <a:endParaRPr lang="de-DE" dirty="0"/>
-          </a:p>
-          <a:p>
-            <a:r>
-              <a:rPr lang="de-DE" dirty="0" err="1"/>
-              <a:t>Animated</a:t>
-            </a:r>
-            <a:r>
-              <a:rPr lang="de-DE" dirty="0"/>
-              <a:t> 3d </a:t>
-            </a:r>
-            <a:r>
-              <a:rPr lang="de-DE" dirty="0" err="1"/>
-              <a:t>perlin</a:t>
-            </a:r>
-            <a:r>
-              <a:rPr lang="de-DE" dirty="0"/>
+            <a:endParaRPr lang="de-DE" dirty="0">
+              <a:solidFill>
+                <a:schemeClr val="bg1"/>
+              </a:solidFill>
+              <a:latin typeface="Bahnschrift" panose="020B0502040204020203" pitchFamily="34" charset="0"/>
+            </a:endParaRPr>
+          </a:p>
+          <a:p>
+            <a:r>
+              <a:rPr lang="de-DE" dirty="0">
+                <a:solidFill>
+                  <a:schemeClr val="bg1"/>
+                </a:solidFill>
+                <a:latin typeface="Bahnschrift" panose="020B0502040204020203" pitchFamily="34" charset="0"/>
+              </a:rPr>
+              <a:t>3 </a:t>
+            </a:r>
+            <a:r>
+              <a:rPr lang="de-DE" dirty="0" err="1">
+                <a:solidFill>
+                  <a:schemeClr val="bg1"/>
+                </a:solidFill>
+                <a:latin typeface="Bahnschrift" panose="020B0502040204020203" pitchFamily="34" charset="0"/>
+              </a:rPr>
+              <a:t>compute</a:t>
+            </a:r>
+            <a:r>
+              <a:rPr lang="de-DE" dirty="0">
+                <a:solidFill>
+                  <a:schemeClr val="bg1"/>
+                </a:solidFill>
+                <a:latin typeface="Bahnschrift" panose="020B0502040204020203" pitchFamily="34" charset="0"/>
+              </a:rPr>
               <a:t> </a:t>
             </a:r>
             <a:r>
-              <a:rPr lang="de-DE" dirty="0" err="1"/>
-              <a:t>noise</a:t>
-            </a:r>
-            <a:endParaRPr lang="de-DE" dirty="0"/>
-          </a:p>
-          <a:p>
-            <a:r>
-              <a:rPr lang="de-DE" dirty="0" err="1"/>
-              <a:t>Analytic</a:t>
-            </a:r>
-            <a:r>
-              <a:rPr lang="de-DE" dirty="0"/>
+              <a:rPr lang="de-DE" dirty="0" err="1">
+                <a:solidFill>
+                  <a:schemeClr val="bg1"/>
+                </a:solidFill>
+                <a:latin typeface="Bahnschrift" panose="020B0502040204020203" pitchFamily="34" charset="0"/>
+              </a:rPr>
+              <a:t>passes</a:t>
+            </a:r>
+            <a:r>
+              <a:rPr lang="de-DE" dirty="0">
+                <a:solidFill>
+                  <a:schemeClr val="bg1"/>
+                </a:solidFill>
+                <a:latin typeface="Bahnschrift" panose="020B0502040204020203" pitchFamily="34" charset="0"/>
+              </a:rPr>
+              <a:t>, </a:t>
+            </a:r>
+            <a:r>
+              <a:rPr lang="de-DE" dirty="0" err="1">
+                <a:solidFill>
+                  <a:schemeClr val="bg1"/>
+                </a:solidFill>
+                <a:latin typeface="Bahnschrift" panose="020B0502040204020203" pitchFamily="34" charset="0"/>
+              </a:rPr>
+              <a:t>apply</a:t>
+            </a:r>
+            <a:r>
+              <a:rPr lang="de-DE" dirty="0">
+                <a:solidFill>
+                  <a:schemeClr val="bg1"/>
+                </a:solidFill>
+                <a:latin typeface="Bahnschrift" panose="020B0502040204020203" pitchFamily="34" charset="0"/>
+              </a:rPr>
               <a:t> </a:t>
             </a:r>
             <a:r>
-              <a:rPr lang="de-DE" dirty="0" err="1"/>
+              <a:rPr lang="de-DE" dirty="0" err="1">
+                <a:solidFill>
+                  <a:schemeClr val="bg1"/>
+                </a:solidFill>
+                <a:latin typeface="Bahnschrift" panose="020B0502040204020203" pitchFamily="34" charset="0"/>
+              </a:rPr>
               <a:t>fog</a:t>
             </a:r>
-            <a:endParaRPr lang="de-DE" dirty="0"/>
-          </a:p>
-          <a:p>
-            <a:r>
-              <a:rPr lang="de-DE" dirty="0"/>
-              <a:t>3 </a:t>
-            </a:r>
-            <a:r>
-              <a:rPr lang="de-DE" dirty="0" err="1"/>
-              <a:t>compute</a:t>
-            </a:r>
-            <a:r>
-              <a:rPr lang="de-DE" dirty="0"/>
+            <a:r>
+              <a:rPr lang="de-DE" dirty="0">
+                <a:solidFill>
+                  <a:schemeClr val="bg1"/>
+                </a:solidFill>
+                <a:latin typeface="Bahnschrift" panose="020B0502040204020203" pitchFamily="34" charset="0"/>
+              </a:rPr>
+              <a:t> in </a:t>
+            </a:r>
+            <a:r>
+              <a:rPr lang="de-DE" dirty="0" err="1">
+                <a:solidFill>
+                  <a:schemeClr val="bg1"/>
+                </a:solidFill>
+                <a:latin typeface="Bahnschrift" panose="020B0502040204020203" pitchFamily="34" charset="0"/>
+              </a:rPr>
+              <a:t>pixel</a:t>
+            </a:r>
+            <a:r>
+              <a:rPr lang="de-DE" dirty="0">
+                <a:solidFill>
+                  <a:schemeClr val="bg1"/>
+                </a:solidFill>
+                <a:latin typeface="Bahnschrift" panose="020B0502040204020203" pitchFamily="34" charset="0"/>
+              </a:rPr>
               <a:t> </a:t>
             </a:r>
             <a:r>
-              <a:rPr lang="de-DE" dirty="0" err="1"/>
-              <a:t>passes</a:t>
-            </a:r>
-            <a:r>
-              <a:rPr lang="de-DE" dirty="0"/>
-              <a:t>, </a:t>
-            </a:r>
-            <a:r>
-              <a:rPr lang="de-DE" dirty="0" err="1"/>
-              <a:t>apply</a:t>
-            </a:r>
-            <a:r>
-              <a:rPr lang="de-DE" dirty="0"/>
-              <a:t> </a:t>
-            </a:r>
-            <a:r>
-              <a:rPr lang="de-DE" dirty="0" err="1"/>
-              <a:t>fog</a:t>
-            </a:r>
-            <a:r>
-              <a:rPr lang="de-DE" dirty="0"/>
-              <a:t> in </a:t>
-            </a:r>
-            <a:r>
-              <a:rPr lang="de-DE" dirty="0" err="1"/>
-              <a:t>pixel</a:t>
-            </a:r>
-            <a:r>
-              <a:rPr lang="de-DE" dirty="0"/>
-              <a:t> </a:t>
-            </a:r>
-            <a:r>
-              <a:rPr lang="de-DE" dirty="0" err="1"/>
+              <a:rPr lang="de-DE" dirty="0" err="1">
+                <a:solidFill>
+                  <a:schemeClr val="bg1"/>
+                </a:solidFill>
+                <a:latin typeface="Bahnschrift" panose="020B0502040204020203" pitchFamily="34" charset="0"/>
+              </a:rPr>
               <a:t>shader</a:t>
             </a:r>
-            <a:endParaRPr lang="de-DE" dirty="0"/>
+            <a:endParaRPr lang="de-DE" dirty="0">
+              <a:solidFill>
+                <a:schemeClr val="bg1"/>
+              </a:solidFill>
+              <a:latin typeface="Bahnschrift" panose="020B0502040204020203" pitchFamily="34" charset="0"/>
+            </a:endParaRPr>
           </a:p>
         </p:txBody>
       </p:sp>
@@ -4394,9 +5285,15 @@
           <a:lstStyle/>
           <a:p>
             <a:r>
-              <a:rPr lang="de-DE" dirty="0"/>
-              <a:t>Temporal Supersampling (1 min)</a:t>
-            </a:r>
+              <a:rPr lang="de-DE" dirty="0">
+                <a:solidFill>
+                  <a:schemeClr val="accent2"/>
+                </a:solidFill>
+                <a:latin typeface="Bahnschrift" panose="020B0502040204020203" pitchFamily="34" charset="0"/>
+              </a:rPr>
+              <a:t>Temporal Supersampling</a:t>
+            </a:r>
+            <a:endParaRPr lang="de-DE" dirty="0"/>
           </a:p>
         </p:txBody>
       </p:sp>
@@ -4416,65 +5313,895 @@
             <p:ph idx="1"/>
           </p:nvPr>
         </p:nvSpPr>
-        <p:spPr/>
+        <p:spPr>
+          <a:xfrm>
+            <a:off x="838200" y="1600200"/>
+            <a:ext cx="10515600" cy="4576763"/>
+          </a:xfrm>
+        </p:spPr>
         <p:txBody>
           <a:bodyPr/>
           <a:lstStyle/>
           <a:p>
             <a:r>
-              <a:rPr lang="de-DE" dirty="0" err="1"/>
+              <a:rPr lang="de-DE" dirty="0">
+                <a:solidFill>
+                  <a:schemeClr val="bg1"/>
+                </a:solidFill>
+                <a:latin typeface="Bahnschrift" panose="020B0502040204020203" pitchFamily="34" charset="0"/>
+              </a:rPr>
+              <a:t>Use </a:t>
+            </a:r>
+            <a:r>
+              <a:rPr lang="de-DE" dirty="0" err="1">
+                <a:solidFill>
+                  <a:schemeClr val="bg1"/>
+                </a:solidFill>
+                <a:latin typeface="Bahnschrift" panose="020B0502040204020203" pitchFamily="34" charset="0"/>
+              </a:rPr>
+              <a:t>previous</a:t>
+            </a:r>
+            <a:r>
+              <a:rPr lang="de-DE" dirty="0">
+                <a:solidFill>
+                  <a:schemeClr val="bg1"/>
+                </a:solidFill>
+                <a:latin typeface="Bahnschrift" panose="020B0502040204020203" pitchFamily="34" charset="0"/>
+              </a:rPr>
+              <a:t> </a:t>
+            </a:r>
+            <a:r>
+              <a:rPr lang="de-DE" dirty="0" err="1">
+                <a:solidFill>
+                  <a:schemeClr val="bg1"/>
+                </a:solidFill>
+                <a:latin typeface="Bahnschrift" panose="020B0502040204020203" pitchFamily="34" charset="0"/>
+              </a:rPr>
+              <a:t>frames</a:t>
+            </a:r>
+            <a:r>
+              <a:rPr lang="de-DE" dirty="0">
+                <a:solidFill>
+                  <a:schemeClr val="bg1"/>
+                </a:solidFill>
+                <a:latin typeface="Bahnschrift" panose="020B0502040204020203" pitchFamily="34" charset="0"/>
+              </a:rPr>
+              <a:t> </a:t>
+            </a:r>
+            <a:r>
+              <a:rPr lang="de-DE" dirty="0" err="1">
+                <a:solidFill>
+                  <a:schemeClr val="bg1"/>
+                </a:solidFill>
+                <a:latin typeface="Bahnschrift" panose="020B0502040204020203" pitchFamily="34" charset="0"/>
+              </a:rPr>
+              <a:t>to</a:t>
+            </a:r>
+            <a:r>
+              <a:rPr lang="de-DE" dirty="0">
+                <a:solidFill>
+                  <a:schemeClr val="bg1"/>
+                </a:solidFill>
+                <a:latin typeface="Bahnschrift" panose="020B0502040204020203" pitchFamily="34" charset="0"/>
+              </a:rPr>
+              <a:t> </a:t>
+            </a:r>
+            <a:r>
+              <a:rPr lang="de-DE" dirty="0" err="1">
+                <a:solidFill>
+                  <a:schemeClr val="bg1"/>
+                </a:solidFill>
+                <a:latin typeface="Bahnschrift" panose="020B0502040204020203" pitchFamily="34" charset="0"/>
+              </a:rPr>
+              <a:t>increase</a:t>
+            </a:r>
+            <a:r>
+              <a:rPr lang="de-DE" dirty="0">
+                <a:solidFill>
+                  <a:schemeClr val="bg1"/>
+                </a:solidFill>
+                <a:latin typeface="Bahnschrift" panose="020B0502040204020203" pitchFamily="34" charset="0"/>
+              </a:rPr>
+              <a:t> sample </a:t>
+            </a:r>
+            <a:r>
+              <a:rPr lang="de-DE" dirty="0" err="1">
+                <a:solidFill>
+                  <a:schemeClr val="bg1"/>
+                </a:solidFill>
+                <a:latin typeface="Bahnschrift" panose="020B0502040204020203" pitchFamily="34" charset="0"/>
+              </a:rPr>
+              <a:t>count</a:t>
+            </a:r>
+            <a:endParaRPr lang="de-DE" dirty="0">
+              <a:solidFill>
+                <a:schemeClr val="bg1"/>
+              </a:solidFill>
+              <a:latin typeface="Bahnschrift" panose="020B0502040204020203" pitchFamily="34" charset="0"/>
+            </a:endParaRPr>
+          </a:p>
+          <a:p>
+            <a:r>
+              <a:rPr lang="de-DE" dirty="0" err="1">
+                <a:solidFill>
+                  <a:schemeClr val="bg1"/>
+                </a:solidFill>
+                <a:latin typeface="Bahnschrift" panose="020B0502040204020203" pitchFamily="34" charset="0"/>
+              </a:rPr>
               <a:t>Exponential</a:t>
             </a:r>
             <a:r>
-              <a:rPr lang="de-DE" dirty="0"/>
+              <a:rPr lang="de-DE" dirty="0">
+                <a:solidFill>
+                  <a:schemeClr val="bg1"/>
+                </a:solidFill>
+                <a:latin typeface="Bahnschrift" panose="020B0502040204020203" pitchFamily="34" charset="0"/>
+              </a:rPr>
               <a:t> </a:t>
             </a:r>
             <a:r>
-              <a:rPr lang="de-DE" dirty="0" err="1"/>
+              <a:rPr lang="de-DE" dirty="0" err="1">
+                <a:solidFill>
+                  <a:schemeClr val="bg1"/>
+                </a:solidFill>
+                <a:latin typeface="Bahnschrift" panose="020B0502040204020203" pitchFamily="34" charset="0"/>
+              </a:rPr>
               <a:t>moving</a:t>
             </a:r>
             <a:r>
-              <a:rPr lang="de-DE" dirty="0"/>
+              <a:rPr lang="de-DE" dirty="0">
+                <a:solidFill>
+                  <a:schemeClr val="bg1"/>
+                </a:solidFill>
+                <a:latin typeface="Bahnschrift" panose="020B0502040204020203" pitchFamily="34" charset="0"/>
+              </a:rPr>
               <a:t> </a:t>
             </a:r>
             <a:r>
-              <a:rPr lang="de-DE" dirty="0" err="1"/>
+              <a:rPr lang="de-DE" dirty="0" err="1">
+                <a:solidFill>
+                  <a:schemeClr val="bg1"/>
+                </a:solidFill>
+                <a:latin typeface="Bahnschrift" panose="020B0502040204020203" pitchFamily="34" charset="0"/>
+              </a:rPr>
               <a:t>average</a:t>
             </a:r>
-            <a:endParaRPr lang="de-DE" dirty="0"/>
-          </a:p>
-          <a:p>
-            <a:r>
-              <a:rPr lang="de-DE" dirty="0" err="1"/>
+            <a:endParaRPr lang="de-DE" dirty="0">
+              <a:solidFill>
+                <a:schemeClr val="bg1"/>
+              </a:solidFill>
+              <a:latin typeface="Bahnschrift" panose="020B0502040204020203" pitchFamily="34" charset="0"/>
+            </a:endParaRPr>
+          </a:p>
+          <a:p>
+            <a:pPr lvl="1"/>
+            <a:endParaRPr lang="de-DE" dirty="0">
+              <a:solidFill>
+                <a:schemeClr val="bg1"/>
+              </a:solidFill>
+              <a:latin typeface="Bahnschrift" panose="020B0502040204020203" pitchFamily="34" charset="0"/>
+            </a:endParaRPr>
+          </a:p>
+          <a:p>
+            <a:endParaRPr lang="de-DE" dirty="0">
+              <a:solidFill>
+                <a:schemeClr val="bg1"/>
+              </a:solidFill>
+              <a:latin typeface="Bahnschrift" panose="020B0502040204020203" pitchFamily="34" charset="0"/>
+            </a:endParaRPr>
+          </a:p>
+          <a:p>
+            <a:endParaRPr lang="de-DE" dirty="0">
+              <a:solidFill>
+                <a:schemeClr val="bg1"/>
+              </a:solidFill>
+              <a:latin typeface="Bahnschrift" panose="020B0502040204020203" pitchFamily="34" charset="0"/>
+            </a:endParaRPr>
+          </a:p>
+          <a:p>
+            <a:endParaRPr lang="de-DE" dirty="0">
+              <a:solidFill>
+                <a:schemeClr val="bg1"/>
+              </a:solidFill>
+              <a:latin typeface="Bahnschrift" panose="020B0502040204020203" pitchFamily="34" charset="0"/>
+            </a:endParaRPr>
+          </a:p>
+          <a:p>
+            <a:r>
+              <a:rPr lang="de-DE" dirty="0" err="1">
+                <a:solidFill>
+                  <a:schemeClr val="bg1"/>
+                </a:solidFill>
+                <a:latin typeface="Bahnschrift" panose="020B0502040204020203" pitchFamily="34" charset="0"/>
+              </a:rPr>
               <a:t>Halton</a:t>
             </a:r>
             <a:r>
-              <a:rPr lang="de-DE" dirty="0"/>
+              <a:rPr lang="de-DE" dirty="0">
+                <a:solidFill>
+                  <a:schemeClr val="bg1"/>
+                </a:solidFill>
+                <a:latin typeface="Bahnschrift" panose="020B0502040204020203" pitchFamily="34" charset="0"/>
+              </a:rPr>
               <a:t> </a:t>
             </a:r>
             <a:r>
-              <a:rPr lang="de-DE" dirty="0" err="1"/>
+              <a:rPr lang="de-DE" dirty="0" err="1">
+                <a:solidFill>
+                  <a:schemeClr val="bg1"/>
+                </a:solidFill>
+                <a:latin typeface="Bahnschrift" panose="020B0502040204020203" pitchFamily="34" charset="0"/>
+              </a:rPr>
               <a:t>sequence</a:t>
             </a:r>
-            <a:endParaRPr lang="de-DE" dirty="0"/>
-          </a:p>
-          <a:p>
-            <a:r>
-              <a:rPr lang="de-DE" dirty="0" err="1"/>
+            <a:endParaRPr lang="de-DE" dirty="0">
+              <a:solidFill>
+                <a:schemeClr val="bg1"/>
+              </a:solidFill>
+              <a:latin typeface="Bahnschrift" panose="020B0502040204020203" pitchFamily="34" charset="0"/>
+            </a:endParaRPr>
+          </a:p>
+          <a:p>
+            <a:r>
+              <a:rPr lang="de-DE" dirty="0" err="1">
+                <a:solidFill>
+                  <a:schemeClr val="bg1"/>
+                </a:solidFill>
+                <a:latin typeface="Bahnschrift" panose="020B0502040204020203" pitchFamily="34" charset="0"/>
+              </a:rPr>
               <a:t>Neighborhood</a:t>
             </a:r>
             <a:r>
-              <a:rPr lang="de-DE" dirty="0"/>
+              <a:rPr lang="de-DE" dirty="0">
+                <a:solidFill>
+                  <a:schemeClr val="bg1"/>
+                </a:solidFill>
+                <a:latin typeface="Bahnschrift" panose="020B0502040204020203" pitchFamily="34" charset="0"/>
+              </a:rPr>
               <a:t> </a:t>
             </a:r>
             <a:r>
-              <a:rPr lang="de-DE" dirty="0" err="1"/>
+              <a:rPr lang="de-DE" dirty="0" err="1">
+                <a:solidFill>
+                  <a:schemeClr val="bg1"/>
+                </a:solidFill>
+                <a:latin typeface="Bahnschrift" panose="020B0502040204020203" pitchFamily="34" charset="0"/>
+              </a:rPr>
               <a:t>clamping</a:t>
             </a:r>
-            <a:endParaRPr lang="de-DE" dirty="0"/>
-          </a:p>
-        </p:txBody>
-      </p:sp>
+            <a:r>
+              <a:rPr lang="de-DE" dirty="0">
+                <a:solidFill>
+                  <a:schemeClr val="bg1"/>
+                </a:solidFill>
+                <a:latin typeface="Bahnschrift" panose="020B0502040204020203" pitchFamily="34" charset="0"/>
+              </a:rPr>
+              <a:t> </a:t>
+            </a:r>
+            <a:r>
+              <a:rPr lang="de-DE" dirty="0" err="1">
+                <a:solidFill>
+                  <a:schemeClr val="bg1"/>
+                </a:solidFill>
+                <a:latin typeface="Bahnschrift" panose="020B0502040204020203" pitchFamily="34" charset="0"/>
+              </a:rPr>
+              <a:t>to</a:t>
+            </a:r>
+            <a:r>
+              <a:rPr lang="de-DE" dirty="0">
+                <a:solidFill>
+                  <a:schemeClr val="bg1"/>
+                </a:solidFill>
+                <a:latin typeface="Bahnschrift" panose="020B0502040204020203" pitchFamily="34" charset="0"/>
+              </a:rPr>
+              <a:t> </a:t>
+            </a:r>
+            <a:r>
+              <a:rPr lang="de-DE" dirty="0" err="1">
+                <a:solidFill>
+                  <a:schemeClr val="bg1"/>
+                </a:solidFill>
+                <a:latin typeface="Bahnschrift" panose="020B0502040204020203" pitchFamily="34" charset="0"/>
+              </a:rPr>
+              <a:t>avoid</a:t>
+            </a:r>
+            <a:r>
+              <a:rPr lang="de-DE" dirty="0">
+                <a:solidFill>
+                  <a:schemeClr val="bg1"/>
+                </a:solidFill>
+                <a:latin typeface="Bahnschrift" panose="020B0502040204020203" pitchFamily="34" charset="0"/>
+              </a:rPr>
+              <a:t> </a:t>
+            </a:r>
+            <a:r>
+              <a:rPr lang="de-DE" dirty="0" err="1">
+                <a:solidFill>
+                  <a:schemeClr val="bg1"/>
+                </a:solidFill>
+                <a:latin typeface="Bahnschrift" panose="020B0502040204020203" pitchFamily="34" charset="0"/>
+              </a:rPr>
+              <a:t>ghosting</a:t>
+            </a:r>
+            <a:endParaRPr lang="de-DE" dirty="0">
+              <a:solidFill>
+                <a:schemeClr val="bg1"/>
+              </a:solidFill>
+              <a:latin typeface="Bahnschrift" panose="020B0502040204020203" pitchFamily="34" charset="0"/>
+            </a:endParaRPr>
+          </a:p>
+        </p:txBody>
+      </p:sp>
+      <p:sp>
+        <p:nvSpPr>
+          <p:cNvPr id="4" name="Rechteck: abgerundete Ecken 3">
+            <a:extLst>
+              <a:ext uri="{FF2B5EF4-FFF2-40B4-BE49-F238E27FC236}">
+                <a16:creationId xmlns:a16="http://schemas.microsoft.com/office/drawing/2014/main" id="{537473B4-92DA-448C-A649-D3B903CF92CF}"/>
+              </a:ext>
+            </a:extLst>
+          </p:cNvPr>
+          <p:cNvSpPr/>
+          <p:nvPr/>
+        </p:nvSpPr>
+        <p:spPr>
+          <a:xfrm>
+            <a:off x="1518815" y="3238500"/>
+            <a:ext cx="2530137" cy="914400"/>
+          </a:xfrm>
+          <a:prstGeom prst="roundRect">
+            <a:avLst>
+              <a:gd name="adj" fmla="val 22492"/>
+            </a:avLst>
+          </a:prstGeom>
+          <a:solidFill>
+            <a:schemeClr val="accent6"/>
+          </a:solidFill>
+        </p:spPr>
+        <p:style>
+          <a:lnRef idx="2">
+            <a:schemeClr val="dk1">
+              <a:shade val="50000"/>
+            </a:schemeClr>
+          </a:lnRef>
+          <a:fillRef idx="1">
+            <a:schemeClr val="dk1"/>
+          </a:fillRef>
+          <a:effectRef idx="0">
+            <a:schemeClr val="dk1"/>
+          </a:effectRef>
+          <a:fontRef idx="minor">
+            <a:schemeClr val="lt1"/>
+          </a:fontRef>
+        </p:style>
+        <p:txBody>
+          <a:bodyPr rot="0" spcFirstLastPara="0" vertOverflow="overflow" horzOverflow="overflow" vert="horz" wrap="square" lIns="91440" tIns="45720" rIns="91440" bIns="45720" numCol="1" spcCol="0" rtlCol="0" fromWordArt="0" anchor="ctr" anchorCtr="0" forceAA="0" compatLnSpc="1">
+            <a:prstTxWarp prst="textNoShape">
+              <a:avLst/>
+            </a:prstTxWarp>
+            <a:noAutofit/>
+          </a:bodyPr>
+          <a:lstStyle/>
+          <a:p>
+            <a:pPr algn="ctr"/>
+            <a:r>
+              <a:rPr lang="de-DE" dirty="0" err="1">
+                <a:ln w="0"/>
+                <a:solidFill>
+                  <a:schemeClr val="bg1"/>
+                </a:solidFill>
+                <a:effectLst>
+                  <a:outerShdw blurRad="38100" dist="19050" dir="2700000" algn="tl" rotWithShape="0">
+                    <a:schemeClr val="dk1">
+                      <a:alpha val="40000"/>
+                    </a:schemeClr>
+                  </a:outerShdw>
+                </a:effectLst>
+              </a:rPr>
+              <a:t>Compute</a:t>
+            </a:r>
+            <a:r>
+              <a:rPr lang="de-DE" dirty="0">
+                <a:ln w="0"/>
+                <a:solidFill>
+                  <a:schemeClr val="bg1"/>
+                </a:solidFill>
+                <a:effectLst>
+                  <a:outerShdw blurRad="38100" dist="19050" dir="2700000" algn="tl" rotWithShape="0">
+                    <a:schemeClr val="dk1">
+                      <a:alpha val="40000"/>
+                    </a:schemeClr>
+                  </a:outerShdw>
+                </a:effectLst>
+              </a:rPr>
+              <a:t> Density and </a:t>
+            </a:r>
+            <a:r>
+              <a:rPr lang="de-DE" dirty="0" err="1">
+                <a:ln w="0"/>
+                <a:solidFill>
+                  <a:schemeClr val="bg1"/>
+                </a:solidFill>
+                <a:effectLst>
+                  <a:outerShdw blurRad="38100" dist="19050" dir="2700000" algn="tl" rotWithShape="0">
+                    <a:schemeClr val="dk1">
+                      <a:alpha val="40000"/>
+                    </a:schemeClr>
+                  </a:outerShdw>
+                </a:effectLst>
+              </a:rPr>
+              <a:t>Lighting</a:t>
+            </a:r>
+            <a:endParaRPr lang="de-DE" dirty="0">
+              <a:ln w="0"/>
+              <a:solidFill>
+                <a:schemeClr val="bg1"/>
+              </a:solidFill>
+              <a:effectLst>
+                <a:outerShdw blurRad="38100" dist="19050" dir="2700000" algn="tl" rotWithShape="0">
+                  <a:schemeClr val="dk1">
+                    <a:alpha val="40000"/>
+                  </a:schemeClr>
+                </a:outerShdw>
+              </a:effectLst>
+            </a:endParaRPr>
+          </a:p>
+        </p:txBody>
+      </p:sp>
+      <p:sp>
+        <p:nvSpPr>
+          <p:cNvPr id="5" name="Rechteck: abgerundete Ecken 4">
+            <a:extLst>
+              <a:ext uri="{FF2B5EF4-FFF2-40B4-BE49-F238E27FC236}">
+                <a16:creationId xmlns:a16="http://schemas.microsoft.com/office/drawing/2014/main" id="{7FBFE0A7-66EA-41D3-81C0-9EF0D9DF6473}"/>
+              </a:ext>
+            </a:extLst>
+          </p:cNvPr>
+          <p:cNvSpPr/>
+          <p:nvPr/>
+        </p:nvSpPr>
+        <p:spPr>
+          <a:xfrm>
+            <a:off x="5171239" y="3238500"/>
+            <a:ext cx="2530137" cy="914400"/>
+          </a:xfrm>
+          <a:prstGeom prst="roundRect">
+            <a:avLst>
+              <a:gd name="adj" fmla="val 22492"/>
+            </a:avLst>
+          </a:prstGeom>
+          <a:solidFill>
+            <a:schemeClr val="accent6"/>
+          </a:solidFill>
+        </p:spPr>
+        <p:style>
+          <a:lnRef idx="2">
+            <a:schemeClr val="dk1">
+              <a:shade val="50000"/>
+            </a:schemeClr>
+          </a:lnRef>
+          <a:fillRef idx="1">
+            <a:schemeClr val="dk1"/>
+          </a:fillRef>
+          <a:effectRef idx="0">
+            <a:schemeClr val="dk1"/>
+          </a:effectRef>
+          <a:fontRef idx="minor">
+            <a:schemeClr val="lt1"/>
+          </a:fontRef>
+        </p:style>
+        <p:txBody>
+          <a:bodyPr rot="0" spcFirstLastPara="0" vertOverflow="overflow" horzOverflow="overflow" vert="horz" wrap="square" lIns="91440" tIns="45720" rIns="91440" bIns="45720" numCol="1" spcCol="0" rtlCol="0" fromWordArt="0" anchor="ctr" anchorCtr="0" forceAA="0" compatLnSpc="1">
+            <a:prstTxWarp prst="textNoShape">
+              <a:avLst/>
+            </a:prstTxWarp>
+            <a:noAutofit/>
+          </a:bodyPr>
+          <a:lstStyle/>
+          <a:p>
+            <a:pPr algn="ctr"/>
+            <a:r>
+              <a:rPr lang="de-DE" dirty="0">
+                <a:ln w="0"/>
+                <a:solidFill>
+                  <a:schemeClr val="bg1"/>
+                </a:solidFill>
+                <a:effectLst>
+                  <a:outerShdw blurRad="38100" dist="19050" dir="2700000" algn="tl" rotWithShape="0">
+                    <a:schemeClr val="dk1">
+                      <a:alpha val="40000"/>
+                    </a:schemeClr>
+                  </a:outerShdw>
+                </a:effectLst>
+              </a:rPr>
+              <a:t>Average and </a:t>
+            </a:r>
+            <a:r>
+              <a:rPr lang="de-DE" dirty="0" err="1">
+                <a:ln w="0"/>
+                <a:solidFill>
+                  <a:schemeClr val="bg1"/>
+                </a:solidFill>
+                <a:effectLst>
+                  <a:outerShdw blurRad="38100" dist="19050" dir="2700000" algn="tl" rotWithShape="0">
+                    <a:schemeClr val="dk1">
+                      <a:alpha val="40000"/>
+                    </a:schemeClr>
+                  </a:outerShdw>
+                </a:effectLst>
+              </a:rPr>
+              <a:t>clamp</a:t>
+            </a:r>
+            <a:endParaRPr lang="de-DE" dirty="0">
+              <a:ln w="0"/>
+              <a:solidFill>
+                <a:schemeClr val="bg1"/>
+              </a:solidFill>
+              <a:effectLst>
+                <a:outerShdw blurRad="38100" dist="19050" dir="2700000" algn="tl" rotWithShape="0">
+                  <a:schemeClr val="dk1">
+                    <a:alpha val="40000"/>
+                  </a:schemeClr>
+                </a:outerShdw>
+              </a:effectLst>
+            </a:endParaRPr>
+          </a:p>
+        </p:txBody>
+      </p:sp>
+      <p:cxnSp>
+        <p:nvCxnSpPr>
+          <p:cNvPr id="7" name="Gerade Verbindung mit Pfeil 6">
+            <a:extLst>
+              <a:ext uri="{FF2B5EF4-FFF2-40B4-BE49-F238E27FC236}">
+                <a16:creationId xmlns:a16="http://schemas.microsoft.com/office/drawing/2014/main" id="{B29C5C3C-5A75-4BC0-B113-57ED06CF6061}"/>
+              </a:ext>
+            </a:extLst>
+          </p:cNvPr>
+          <p:cNvCxnSpPr>
+            <a:cxnSpLocks/>
+            <a:stCxn id="4" idx="3"/>
+            <a:endCxn id="5" idx="1"/>
+          </p:cNvCxnSpPr>
+          <p:nvPr/>
+        </p:nvCxnSpPr>
+        <p:spPr>
+          <a:xfrm>
+            <a:off x="4048952" y="3695700"/>
+            <a:ext cx="1122287" cy="0"/>
+          </a:xfrm>
+          <a:prstGeom prst="straightConnector1">
+            <a:avLst/>
+          </a:prstGeom>
+          <a:ln w="63500">
+            <a:tailEnd type="triangle"/>
+          </a:ln>
+        </p:spPr>
+        <p:style>
+          <a:lnRef idx="1">
+            <a:schemeClr val="accent2"/>
+          </a:lnRef>
+          <a:fillRef idx="0">
+            <a:schemeClr val="accent2"/>
+          </a:fillRef>
+          <a:effectRef idx="0">
+            <a:schemeClr val="accent2"/>
+          </a:effectRef>
+          <a:fontRef idx="minor">
+            <a:schemeClr val="tx1"/>
+          </a:fontRef>
+        </p:style>
+      </p:cxnSp>
+      <p:sp>
+        <p:nvSpPr>
+          <p:cNvPr id="10" name="Rechteck: abgerundete Ecken 9">
+            <a:extLst>
+              <a:ext uri="{FF2B5EF4-FFF2-40B4-BE49-F238E27FC236}">
+                <a16:creationId xmlns:a16="http://schemas.microsoft.com/office/drawing/2014/main" id="{448CF9A3-F3FC-476D-9EC4-C82DF8ED2CFA}"/>
+              </a:ext>
+            </a:extLst>
+          </p:cNvPr>
+          <p:cNvSpPr/>
+          <p:nvPr/>
+        </p:nvSpPr>
+        <p:spPr>
+          <a:xfrm>
+            <a:off x="8823663" y="1957388"/>
+            <a:ext cx="2530137" cy="914400"/>
+          </a:xfrm>
+          <a:prstGeom prst="roundRect">
+            <a:avLst>
+              <a:gd name="adj" fmla="val 22492"/>
+            </a:avLst>
+          </a:prstGeom>
+          <a:solidFill>
+            <a:schemeClr val="accent6"/>
+          </a:solidFill>
+        </p:spPr>
+        <p:style>
+          <a:lnRef idx="2">
+            <a:schemeClr val="dk1">
+              <a:shade val="50000"/>
+            </a:schemeClr>
+          </a:lnRef>
+          <a:fillRef idx="1">
+            <a:schemeClr val="dk1"/>
+          </a:fillRef>
+          <a:effectRef idx="0">
+            <a:schemeClr val="dk1"/>
+          </a:effectRef>
+          <a:fontRef idx="minor">
+            <a:schemeClr val="lt1"/>
+          </a:fontRef>
+        </p:style>
+        <p:txBody>
+          <a:bodyPr rot="0" spcFirstLastPara="0" vertOverflow="overflow" horzOverflow="overflow" vert="horz" wrap="square" lIns="91440" tIns="45720" rIns="91440" bIns="45720" numCol="1" spcCol="0" rtlCol="0" fromWordArt="0" anchor="ctr" anchorCtr="0" forceAA="0" compatLnSpc="1">
+            <a:prstTxWarp prst="textNoShape">
+              <a:avLst/>
+            </a:prstTxWarp>
+            <a:noAutofit/>
+          </a:bodyPr>
+          <a:lstStyle/>
+          <a:p>
+            <a:pPr algn="ctr"/>
+            <a:r>
+              <a:rPr lang="de-DE" dirty="0" err="1">
+                <a:ln w="0"/>
+                <a:solidFill>
+                  <a:schemeClr val="bg1"/>
+                </a:solidFill>
+                <a:effectLst>
+                  <a:outerShdw blurRad="38100" dist="19050" dir="2700000" algn="tl" rotWithShape="0">
+                    <a:schemeClr val="dk1">
+                      <a:alpha val="40000"/>
+                    </a:schemeClr>
+                  </a:outerShdw>
+                </a:effectLst>
+              </a:rPr>
+              <a:t>Raymarch</a:t>
+            </a:r>
+            <a:endParaRPr lang="de-DE" dirty="0">
+              <a:ln w="0"/>
+              <a:solidFill>
+                <a:schemeClr val="bg1"/>
+              </a:solidFill>
+              <a:effectLst>
+                <a:outerShdw blurRad="38100" dist="19050" dir="2700000" algn="tl" rotWithShape="0">
+                  <a:schemeClr val="dk1">
+                    <a:alpha val="40000"/>
+                  </a:schemeClr>
+                </a:outerShdw>
+              </a:effectLst>
+            </a:endParaRPr>
+          </a:p>
+        </p:txBody>
+      </p:sp>
+      <p:sp>
+        <p:nvSpPr>
+          <p:cNvPr id="11" name="Rechteck: abgerundete Ecken 10">
+            <a:extLst>
+              <a:ext uri="{FF2B5EF4-FFF2-40B4-BE49-F238E27FC236}">
+                <a16:creationId xmlns:a16="http://schemas.microsoft.com/office/drawing/2014/main" id="{7F56580B-3B26-40EA-A23F-EA787502C1BB}"/>
+              </a:ext>
+            </a:extLst>
+          </p:cNvPr>
+          <p:cNvSpPr/>
+          <p:nvPr/>
+        </p:nvSpPr>
+        <p:spPr>
+          <a:xfrm>
+            <a:off x="8823663" y="3238500"/>
+            <a:ext cx="2530137" cy="914400"/>
+          </a:xfrm>
+          <a:prstGeom prst="roundRect">
+            <a:avLst>
+              <a:gd name="adj" fmla="val 0"/>
+            </a:avLst>
+          </a:prstGeom>
+          <a:solidFill>
+            <a:schemeClr val="accent5"/>
+          </a:solidFill>
+        </p:spPr>
+        <p:style>
+          <a:lnRef idx="2">
+            <a:schemeClr val="dk1">
+              <a:shade val="50000"/>
+            </a:schemeClr>
+          </a:lnRef>
+          <a:fillRef idx="1">
+            <a:schemeClr val="dk1"/>
+          </a:fillRef>
+          <a:effectRef idx="0">
+            <a:schemeClr val="dk1"/>
+          </a:effectRef>
+          <a:fontRef idx="minor">
+            <a:schemeClr val="lt1"/>
+          </a:fontRef>
+        </p:style>
+        <p:txBody>
+          <a:bodyPr rot="0" spcFirstLastPara="0" vertOverflow="overflow" horzOverflow="overflow" vert="horz" wrap="square" lIns="91440" tIns="45720" rIns="91440" bIns="45720" numCol="1" spcCol="0" rtlCol="0" fromWordArt="0" anchor="ctr" anchorCtr="0" forceAA="0" compatLnSpc="1">
+            <a:prstTxWarp prst="textNoShape">
+              <a:avLst/>
+            </a:prstTxWarp>
+            <a:noAutofit/>
+          </a:bodyPr>
+          <a:lstStyle/>
+          <a:p>
+            <a:pPr algn="ctr"/>
+            <a:r>
+              <a:rPr lang="de-DE" dirty="0" err="1">
+                <a:ln w="0"/>
+                <a:solidFill>
+                  <a:schemeClr val="bg1"/>
+                </a:solidFill>
+                <a:effectLst>
+                  <a:outerShdw blurRad="38100" dist="19050" dir="2700000" algn="tl" rotWithShape="0">
+                    <a:schemeClr val="dk1">
+                      <a:alpha val="40000"/>
+                    </a:schemeClr>
+                  </a:outerShdw>
+                </a:effectLst>
+                <a:latin typeface="Bahnschrift" panose="020B0502040204020203" pitchFamily="34" charset="0"/>
+              </a:rPr>
+              <a:t>History</a:t>
+            </a:r>
+            <a:r>
+              <a:rPr lang="de-DE" dirty="0">
+                <a:ln w="0"/>
+                <a:solidFill>
+                  <a:schemeClr val="bg1"/>
+                </a:solidFill>
+                <a:effectLst>
+                  <a:outerShdw blurRad="38100" dist="19050" dir="2700000" algn="tl" rotWithShape="0">
+                    <a:schemeClr val="dk1">
+                      <a:alpha val="40000"/>
+                    </a:schemeClr>
+                  </a:outerShdw>
+                </a:effectLst>
+                <a:latin typeface="Bahnschrift" panose="020B0502040204020203" pitchFamily="34" charset="0"/>
+              </a:rPr>
+              <a:t> Buffer</a:t>
+            </a:r>
+          </a:p>
+        </p:txBody>
+      </p:sp>
+      <p:cxnSp>
+        <p:nvCxnSpPr>
+          <p:cNvPr id="24" name="Verbinder: gewinkelt 23">
+            <a:extLst>
+              <a:ext uri="{FF2B5EF4-FFF2-40B4-BE49-F238E27FC236}">
+                <a16:creationId xmlns:a16="http://schemas.microsoft.com/office/drawing/2014/main" id="{3DC2A5E7-D0F8-4AA2-8C76-8473E10FCC4A}"/>
+              </a:ext>
+            </a:extLst>
+          </p:cNvPr>
+          <p:cNvCxnSpPr>
+            <a:cxnSpLocks/>
+            <a:stCxn id="11" idx="2"/>
+            <a:endCxn id="5" idx="2"/>
+          </p:cNvCxnSpPr>
+          <p:nvPr/>
+        </p:nvCxnSpPr>
+        <p:spPr>
+          <a:xfrm rot="5400000">
+            <a:off x="8262520" y="2326688"/>
+            <a:ext cx="12700" cy="3652424"/>
+          </a:xfrm>
+          <a:prstGeom prst="bentConnector3">
+            <a:avLst>
+              <a:gd name="adj1" fmla="val 3150000"/>
+            </a:avLst>
+          </a:prstGeom>
+          <a:ln w="63500">
+            <a:solidFill>
+              <a:schemeClr val="accent2"/>
+            </a:solidFill>
+            <a:tailEnd type="triangle"/>
+          </a:ln>
+        </p:spPr>
+        <p:style>
+          <a:lnRef idx="1">
+            <a:schemeClr val="accent1"/>
+          </a:lnRef>
+          <a:fillRef idx="0">
+            <a:schemeClr val="accent1"/>
+          </a:fillRef>
+          <a:effectRef idx="0">
+            <a:schemeClr val="accent1"/>
+          </a:effectRef>
+          <a:fontRef idx="minor">
+            <a:schemeClr val="tx1"/>
+          </a:fontRef>
+        </p:style>
+      </p:cxnSp>
+      <p:cxnSp>
+        <p:nvCxnSpPr>
+          <p:cNvPr id="46" name="Gerade Verbindung mit Pfeil 45">
+            <a:extLst>
+              <a:ext uri="{FF2B5EF4-FFF2-40B4-BE49-F238E27FC236}">
+                <a16:creationId xmlns:a16="http://schemas.microsoft.com/office/drawing/2014/main" id="{D14F3548-5BF5-42A1-9B6A-F492BBBCBD82}"/>
+              </a:ext>
+            </a:extLst>
+          </p:cNvPr>
+          <p:cNvCxnSpPr>
+            <a:cxnSpLocks/>
+            <a:stCxn id="5" idx="3"/>
+            <a:endCxn id="11" idx="1"/>
+          </p:cNvCxnSpPr>
+          <p:nvPr/>
+        </p:nvCxnSpPr>
+        <p:spPr>
+          <a:xfrm>
+            <a:off x="7701376" y="3695700"/>
+            <a:ext cx="1122287" cy="0"/>
+          </a:xfrm>
+          <a:prstGeom prst="straightConnector1">
+            <a:avLst/>
+          </a:prstGeom>
+          <a:ln w="63500">
+            <a:tailEnd type="triangle"/>
+          </a:ln>
+        </p:spPr>
+        <p:style>
+          <a:lnRef idx="1">
+            <a:schemeClr val="accent2"/>
+          </a:lnRef>
+          <a:fillRef idx="0">
+            <a:schemeClr val="accent2"/>
+          </a:fillRef>
+          <a:effectRef idx="0">
+            <a:schemeClr val="accent2"/>
+          </a:effectRef>
+          <a:fontRef idx="minor">
+            <a:schemeClr val="tx1"/>
+          </a:fontRef>
+        </p:style>
+      </p:cxnSp>
+      <p:cxnSp>
+        <p:nvCxnSpPr>
+          <p:cNvPr id="48" name="Verbinder: gewinkelt 47">
+            <a:extLst>
+              <a:ext uri="{FF2B5EF4-FFF2-40B4-BE49-F238E27FC236}">
+                <a16:creationId xmlns:a16="http://schemas.microsoft.com/office/drawing/2014/main" id="{F234D388-F8FA-4B4B-8532-978533EDAC3E}"/>
+              </a:ext>
+            </a:extLst>
+          </p:cNvPr>
+          <p:cNvCxnSpPr>
+            <a:cxnSpLocks/>
+            <a:endCxn id="10" idx="1"/>
+          </p:cNvCxnSpPr>
+          <p:nvPr/>
+        </p:nvCxnSpPr>
+        <p:spPr>
+          <a:xfrm flipV="1">
+            <a:off x="7701376" y="2414588"/>
+            <a:ext cx="1122287" cy="1109662"/>
+          </a:xfrm>
+          <a:prstGeom prst="bentConnector3">
+            <a:avLst>
+              <a:gd name="adj1" fmla="val 50000"/>
+            </a:avLst>
+          </a:prstGeom>
+          <a:ln w="63500">
+            <a:solidFill>
+              <a:schemeClr val="accent2"/>
+            </a:solidFill>
+            <a:tailEnd type="triangle"/>
+          </a:ln>
+        </p:spPr>
+        <p:style>
+          <a:lnRef idx="1">
+            <a:schemeClr val="accent1"/>
+          </a:lnRef>
+          <a:fillRef idx="0">
+            <a:schemeClr val="accent1"/>
+          </a:fillRef>
+          <a:effectRef idx="0">
+            <a:schemeClr val="accent1"/>
+          </a:effectRef>
+          <a:fontRef idx="minor">
+            <a:schemeClr val="tx1"/>
+          </a:fontRef>
+        </p:style>
+      </p:cxnSp>
     </p:spTree>
     <p:extLst>
       <p:ext uri="{BB962C8B-B14F-4D97-AF65-F5344CB8AC3E}">
@@ -4527,8 +6254,17 @@
           <a:lstStyle/>
           <a:p>
             <a:r>
+              <a:rPr lang="de-DE" dirty="0">
+                <a:solidFill>
+                  <a:schemeClr val="accent2"/>
+                </a:solidFill>
+                <a:latin typeface="Bahnschrift" panose="020B0502040204020203" pitchFamily="34" charset="0"/>
+              </a:rPr>
+              <a:t>Dithering</a:t>
+            </a:r>
+            <a:r>
               <a:rPr lang="de-DE" dirty="0"/>
-              <a:t>Dithering (30 sec)</a:t>
+              <a:t> (30 sec)</a:t>
             </a:r>
           </a:p>
         </p:txBody>

</xml_diff>